<commit_message>
finished script and plot figure 2
</commit_message>
<xml_diff>
--- a/figure-assembly/figure-2.pptx
+++ b/figure-assembly/figure-2.pptx
@@ -243,7 +243,7 @@
           <a:p>
             <a:fld id="{2E26A54F-8197-FC45-8BC9-6D7422A795DE}" type="datetimeFigureOut">
               <a:rPr lang="en-US" smtClean="0"/>
-              <a:t>10/30/18</a:t>
+              <a:t>11/18/18</a:t>
             </a:fld>
             <a:endParaRPr lang="en-US"/>
           </a:p>
@@ -413,7 +413,7 @@
           <a:p>
             <a:fld id="{2E26A54F-8197-FC45-8BC9-6D7422A795DE}" type="datetimeFigureOut">
               <a:rPr lang="en-US" smtClean="0"/>
-              <a:t>10/30/18</a:t>
+              <a:t>11/18/18</a:t>
             </a:fld>
             <a:endParaRPr lang="en-US"/>
           </a:p>
@@ -593,7 +593,7 @@
           <a:p>
             <a:fld id="{2E26A54F-8197-FC45-8BC9-6D7422A795DE}" type="datetimeFigureOut">
               <a:rPr lang="en-US" smtClean="0"/>
-              <a:t>10/30/18</a:t>
+              <a:t>11/18/18</a:t>
             </a:fld>
             <a:endParaRPr lang="en-US"/>
           </a:p>
@@ -763,7 +763,7 @@
           <a:p>
             <a:fld id="{2E26A54F-8197-FC45-8BC9-6D7422A795DE}" type="datetimeFigureOut">
               <a:rPr lang="en-US" smtClean="0"/>
-              <a:t>10/30/18</a:t>
+              <a:t>11/18/18</a:t>
             </a:fld>
             <a:endParaRPr lang="en-US"/>
           </a:p>
@@ -1007,7 +1007,7 @@
           <a:p>
             <a:fld id="{2E26A54F-8197-FC45-8BC9-6D7422A795DE}" type="datetimeFigureOut">
               <a:rPr lang="en-US" smtClean="0"/>
-              <a:t>10/30/18</a:t>
+              <a:t>11/18/18</a:t>
             </a:fld>
             <a:endParaRPr lang="en-US"/>
           </a:p>
@@ -1239,7 +1239,7 @@
           <a:p>
             <a:fld id="{2E26A54F-8197-FC45-8BC9-6D7422A795DE}" type="datetimeFigureOut">
               <a:rPr lang="en-US" smtClean="0"/>
-              <a:t>10/30/18</a:t>
+              <a:t>11/18/18</a:t>
             </a:fld>
             <a:endParaRPr lang="en-US"/>
           </a:p>
@@ -1606,7 +1606,7 @@
           <a:p>
             <a:fld id="{2E26A54F-8197-FC45-8BC9-6D7422A795DE}" type="datetimeFigureOut">
               <a:rPr lang="en-US" smtClean="0"/>
-              <a:t>10/30/18</a:t>
+              <a:t>11/18/18</a:t>
             </a:fld>
             <a:endParaRPr lang="en-US"/>
           </a:p>
@@ -1724,7 +1724,7 @@
           <a:p>
             <a:fld id="{2E26A54F-8197-FC45-8BC9-6D7422A795DE}" type="datetimeFigureOut">
               <a:rPr lang="en-US" smtClean="0"/>
-              <a:t>10/30/18</a:t>
+              <a:t>11/18/18</a:t>
             </a:fld>
             <a:endParaRPr lang="en-US"/>
           </a:p>
@@ -1819,7 +1819,7 @@
           <a:p>
             <a:fld id="{2E26A54F-8197-FC45-8BC9-6D7422A795DE}" type="datetimeFigureOut">
               <a:rPr lang="en-US" smtClean="0"/>
-              <a:t>10/30/18</a:t>
+              <a:t>11/18/18</a:t>
             </a:fld>
             <a:endParaRPr lang="en-US"/>
           </a:p>
@@ -2096,7 +2096,7 @@
           <a:p>
             <a:fld id="{2E26A54F-8197-FC45-8BC9-6D7422A795DE}" type="datetimeFigureOut">
               <a:rPr lang="en-US" smtClean="0"/>
-              <a:t>10/30/18</a:t>
+              <a:t>11/18/18</a:t>
             </a:fld>
             <a:endParaRPr lang="en-US"/>
           </a:p>
@@ -2353,7 +2353,7 @@
           <a:p>
             <a:fld id="{2E26A54F-8197-FC45-8BC9-6D7422A795DE}" type="datetimeFigureOut">
               <a:rPr lang="en-US" smtClean="0"/>
-              <a:t>10/30/18</a:t>
+              <a:t>11/18/18</a:t>
             </a:fld>
             <a:endParaRPr lang="en-US"/>
           </a:p>
@@ -2566,7 +2566,7 @@
           <a:p>
             <a:fld id="{2E26A54F-8197-FC45-8BC9-6D7422A795DE}" type="datetimeFigureOut">
               <a:rPr lang="en-US" smtClean="0"/>
-              <a:t>10/30/18</a:t>
+              <a:t>11/18/18</a:t>
             </a:fld>
             <a:endParaRPr lang="en-US"/>
           </a:p>
@@ -2971,12 +2971,48 @@
           <a:chExt cx="0" cy="0"/>
         </a:xfrm>
       </p:grpSpPr>
+      <p:sp>
+        <p:nvSpPr>
+          <p:cNvPr id="40" name="TextBox 39">
+            <a:extLst>
+              <a:ext uri="{FF2B5EF4-FFF2-40B4-BE49-F238E27FC236}">
+                <a16:creationId xmlns:a16="http://schemas.microsoft.com/office/drawing/2014/main" id="{E6406C26-F953-FF4B-ACF9-E07510895AFD}"/>
+              </a:ext>
+            </a:extLst>
+          </p:cNvPr>
+          <p:cNvSpPr txBox="1"/>
+          <p:nvPr/>
+        </p:nvSpPr>
+        <p:spPr>
+          <a:xfrm>
+            <a:off x="19940" y="257097"/>
+            <a:ext cx="653849" cy="384721"/>
+          </a:xfrm>
+          <a:prstGeom prst="rect">
+            <a:avLst/>
+          </a:prstGeom>
+          <a:noFill/>
+        </p:spPr>
+        <p:txBody>
+          <a:bodyPr wrap="square" rtlCol="0">
+            <a:spAutoFit/>
+          </a:bodyPr>
+          <a:lstStyle/>
+          <a:p>
+            <a:pPr algn="ctr"/>
+            <a:r>
+              <a:rPr lang="en-US" sz="1900" dirty="0"/>
+              <a:t>A</a:t>
+            </a:r>
+          </a:p>
+        </p:txBody>
+      </p:sp>
       <p:pic>
         <p:nvPicPr>
-          <p:cNvPr id="39" name="Picture 38">
+          <p:cNvPr id="9" name="Picture 8">
             <a:extLst>
               <a:ext uri="{FF2B5EF4-FFF2-40B4-BE49-F238E27FC236}">
-                <a16:creationId xmlns:a16="http://schemas.microsoft.com/office/drawing/2014/main" id="{24A16FC2-980C-4C49-B29D-09EF8C78C33C}"/>
+                <a16:creationId xmlns:a16="http://schemas.microsoft.com/office/drawing/2014/main" id="{E31BC81B-CD12-D84B-A587-BD0C0EFA3D52}"/>
               </a:ext>
             </a:extLst>
           </p:cNvPr>
@@ -2993,50 +3029,14 @@
         </p:blipFill>
         <p:spPr>
           <a:xfrm>
-            <a:off x="434654" y="675949"/>
-            <a:ext cx="3221243" cy="2583764"/>
+            <a:off x="416596" y="653334"/>
+            <a:ext cx="3265311" cy="2584800"/>
           </a:xfrm>
           <a:prstGeom prst="rect">
             <a:avLst/>
           </a:prstGeom>
         </p:spPr>
       </p:pic>
-      <p:sp>
-        <p:nvSpPr>
-          <p:cNvPr id="40" name="TextBox 39">
-            <a:extLst>
-              <a:ext uri="{FF2B5EF4-FFF2-40B4-BE49-F238E27FC236}">
-                <a16:creationId xmlns:a16="http://schemas.microsoft.com/office/drawing/2014/main" id="{E6406C26-F953-FF4B-ACF9-E07510895AFD}"/>
-              </a:ext>
-            </a:extLst>
-          </p:cNvPr>
-          <p:cNvSpPr txBox="1"/>
-          <p:nvPr/>
-        </p:nvSpPr>
-        <p:spPr>
-          <a:xfrm>
-            <a:off x="19940" y="257097"/>
-            <a:ext cx="653849" cy="384721"/>
-          </a:xfrm>
-          <a:prstGeom prst="rect">
-            <a:avLst/>
-          </a:prstGeom>
-          <a:noFill/>
-        </p:spPr>
-        <p:txBody>
-          <a:bodyPr wrap="square" rtlCol="0">
-            <a:spAutoFit/>
-          </a:bodyPr>
-          <a:lstStyle/>
-          <a:p>
-            <a:pPr algn="ctr"/>
-            <a:r>
-              <a:rPr lang="en-US" sz="1900" dirty="0"/>
-              <a:t>A</a:t>
-            </a:r>
-          </a:p>
-        </p:txBody>
-      </p:sp>
       <p:sp>
         <p:nvSpPr>
           <p:cNvPr id="41" name="TextBox 40">
@@ -3073,8 +3073,8 @@
           </a:p>
         </p:txBody>
       </p:sp>
-      <mc:AlternateContent xmlns:mc="http://schemas.openxmlformats.org/markup-compatibility/2006" xmlns:a14="http://schemas.microsoft.com/office/drawing/2010/main">
-        <mc:Choice Requires="a14">
+      <mc:AlternateContent xmlns:mc="http://schemas.openxmlformats.org/markup-compatibility/2006">
+        <mc:Choice xmlns:a14="http://schemas.microsoft.com/office/drawing/2010/main" Requires="a14">
           <p:sp>
             <p:nvSpPr>
               <p:cNvPr id="4" name="TextBox 3">
@@ -3089,7 +3089,7 @@
             </p:nvSpPr>
             <p:spPr>
               <a:xfrm>
-                <a:off x="1630530" y="1559813"/>
+                <a:off x="1374188" y="1575117"/>
                 <a:ext cx="837445" cy="123111"/>
               </a:xfrm>
               <a:prstGeom prst="rect">
@@ -3146,7 +3146,7 @@
             </p:txBody>
           </p:sp>
         </mc:Choice>
-        <mc:Fallback xmlns="">
+        <mc:Fallback>
           <p:sp>
             <p:nvSpPr>
               <p:cNvPr id="4" name="TextBox 3">
@@ -3163,7 +3163,7 @@
             </p:nvSpPr>
             <p:spPr>
               <a:xfrm>
-                <a:off x="1630530" y="1559813"/>
+                <a:off x="1374188" y="1575117"/>
                 <a:ext cx="837445" cy="123111"/>
               </a:xfrm>
               <a:prstGeom prst="rect">
@@ -3210,8 +3210,8 @@
         </p:nvCxnSpPr>
         <p:spPr>
           <a:xfrm>
-            <a:off x="802629" y="1717859"/>
-            <a:ext cx="2839820" cy="0"/>
+            <a:off x="780492" y="1714033"/>
+            <a:ext cx="2877261" cy="0"/>
           </a:xfrm>
           <a:prstGeom prst="line">
             <a:avLst/>
@@ -3257,8 +3257,8 @@
         </p:nvCxnSpPr>
         <p:spPr>
           <a:xfrm>
-            <a:off x="802629" y="1918742"/>
-            <a:ext cx="2839820" cy="28917"/>
+            <a:off x="780492" y="1947659"/>
+            <a:ext cx="2877261" cy="0"/>
           </a:xfrm>
           <a:prstGeom prst="line">
             <a:avLst/>
@@ -3288,8 +3288,8 @@
           </a:fontRef>
         </p:style>
       </p:cxnSp>
-      <mc:AlternateContent xmlns:mc="http://schemas.openxmlformats.org/markup-compatibility/2006" xmlns:a14="http://schemas.microsoft.com/office/drawing/2010/main">
-        <mc:Choice Requires="a14">
+      <mc:AlternateContent xmlns:mc="http://schemas.openxmlformats.org/markup-compatibility/2006">
+        <mc:Choice xmlns:a14="http://schemas.microsoft.com/office/drawing/2010/main" Requires="a14">
           <p:sp>
             <p:nvSpPr>
               <p:cNvPr id="45" name="TextBox 44">
@@ -3304,7 +3304,7 @@
             </p:nvSpPr>
             <p:spPr>
               <a:xfrm>
-                <a:off x="1753431" y="1782414"/>
+                <a:off x="1543001" y="1809196"/>
                 <a:ext cx="566980" cy="123111"/>
               </a:xfrm>
               <a:prstGeom prst="rect">
@@ -3359,7 +3359,7 @@
             </p:txBody>
           </p:sp>
         </mc:Choice>
-        <mc:Fallback xmlns="">
+        <mc:Fallback>
           <p:sp>
             <p:nvSpPr>
               <p:cNvPr id="45" name="TextBox 44">
@@ -3376,7 +3376,7 @@
             </p:nvSpPr>
             <p:spPr>
               <a:xfrm>
-                <a:off x="1753431" y="1782414"/>
+                <a:off x="1543001" y="1809196"/>
                 <a:ext cx="566980" cy="123111"/>
               </a:xfrm>
               <a:prstGeom prst="rect">

</xml_diff>